<commit_message>
Create PDF files of cSLS-CAC experiment figures to be added to SI section of the manuscipt.
</commit_message>
<xml_diff>
--- a/SI/critical_aggregation_conc/SLS_SI_figure_draft.pptx
+++ b/SI/critical_aggregation_conc/SLS_SI_figure_draft.pptx
@@ -113,7 +113,7 @@
   </p:defaultTextStyle>
   <p:extLst>
     <p:ext uri="{EFAFB233-063F-42B5-8137-9DF3F51BA10A}">
-      <p15:sldGuideLst xmlns:p15="http://schemas.microsoft.com/office/powerpoint/2012/main">
+      <p15:sldGuideLst xmlns:p15="http://schemas.microsoft.com/office/powerpoint/2012/main" xmlns="">
         <p15:guide id="1" orient="horz" pos="2637">
           <p15:clr>
             <a:srgbClr val="A4A3A4"/>
@@ -212,7 +212,7 @@
           <a:p>
             <a:fld id="{A795DAB1-75E5-EE45-9A89-803F0AC90C9D}" type="datetimeFigureOut">
               <a:rPr lang="en-US" smtClean="0"/>
-              <a:t>11/5/18</a:t>
+              <a:t>12/5/18</a:t>
             </a:fld>
             <a:endParaRPr lang="en-US"/>
           </a:p>
@@ -745,7 +745,7 @@
           <a:p>
             <a:fld id="{61EC71EF-7FD6-954C-A622-2C736F9D07E0}" type="datetimeFigureOut">
               <a:rPr lang="en-US" smtClean="0"/>
-              <a:t>11/5/18</a:t>
+              <a:t>12/5/18</a:t>
             </a:fld>
             <a:endParaRPr lang="en-US"/>
           </a:p>
@@ -915,7 +915,7 @@
           <a:p>
             <a:fld id="{61EC71EF-7FD6-954C-A622-2C736F9D07E0}" type="datetimeFigureOut">
               <a:rPr lang="en-US" smtClean="0"/>
-              <a:t>11/5/18</a:t>
+              <a:t>12/5/18</a:t>
             </a:fld>
             <a:endParaRPr lang="en-US"/>
           </a:p>
@@ -1095,7 +1095,7 @@
           <a:p>
             <a:fld id="{61EC71EF-7FD6-954C-A622-2C736F9D07E0}" type="datetimeFigureOut">
               <a:rPr lang="en-US" smtClean="0"/>
-              <a:t>11/5/18</a:t>
+              <a:t>12/5/18</a:t>
             </a:fld>
             <a:endParaRPr lang="en-US"/>
           </a:p>
@@ -1265,7 +1265,7 @@
           <a:p>
             <a:fld id="{61EC71EF-7FD6-954C-A622-2C736F9D07E0}" type="datetimeFigureOut">
               <a:rPr lang="en-US" smtClean="0"/>
-              <a:t>11/5/18</a:t>
+              <a:t>12/5/18</a:t>
             </a:fld>
             <a:endParaRPr lang="en-US"/>
           </a:p>
@@ -1511,7 +1511,7 @@
           <a:p>
             <a:fld id="{61EC71EF-7FD6-954C-A622-2C736F9D07E0}" type="datetimeFigureOut">
               <a:rPr lang="en-US" smtClean="0"/>
-              <a:t>11/5/18</a:t>
+              <a:t>12/5/18</a:t>
             </a:fld>
             <a:endParaRPr lang="en-US"/>
           </a:p>
@@ -1799,7 +1799,7 @@
           <a:p>
             <a:fld id="{61EC71EF-7FD6-954C-A622-2C736F9D07E0}" type="datetimeFigureOut">
               <a:rPr lang="en-US" smtClean="0"/>
-              <a:t>11/5/18</a:t>
+              <a:t>12/5/18</a:t>
             </a:fld>
             <a:endParaRPr lang="en-US"/>
           </a:p>
@@ -2221,7 +2221,7 @@
           <a:p>
             <a:fld id="{61EC71EF-7FD6-954C-A622-2C736F9D07E0}" type="datetimeFigureOut">
               <a:rPr lang="en-US" smtClean="0"/>
-              <a:t>11/5/18</a:t>
+              <a:t>12/5/18</a:t>
             </a:fld>
             <a:endParaRPr lang="en-US"/>
           </a:p>
@@ -2339,7 +2339,7 @@
           <a:p>
             <a:fld id="{61EC71EF-7FD6-954C-A622-2C736F9D07E0}" type="datetimeFigureOut">
               <a:rPr lang="en-US" smtClean="0"/>
-              <a:t>11/5/18</a:t>
+              <a:t>12/5/18</a:t>
             </a:fld>
             <a:endParaRPr lang="en-US"/>
           </a:p>
@@ -2434,7 +2434,7 @@
           <a:p>
             <a:fld id="{61EC71EF-7FD6-954C-A622-2C736F9D07E0}" type="datetimeFigureOut">
               <a:rPr lang="en-US" smtClean="0"/>
-              <a:t>11/5/18</a:t>
+              <a:t>12/5/18</a:t>
             </a:fld>
             <a:endParaRPr lang="en-US"/>
           </a:p>
@@ -2711,7 +2711,7 @@
           <a:p>
             <a:fld id="{61EC71EF-7FD6-954C-A622-2C736F9D07E0}" type="datetimeFigureOut">
               <a:rPr lang="en-US" smtClean="0"/>
-              <a:t>11/5/18</a:t>
+              <a:t>12/5/18</a:t>
             </a:fld>
             <a:endParaRPr lang="en-US"/>
           </a:p>
@@ -2964,7 +2964,7 @@
           <a:p>
             <a:fld id="{61EC71EF-7FD6-954C-A622-2C736F9D07E0}" type="datetimeFigureOut">
               <a:rPr lang="en-US" smtClean="0"/>
-              <a:t>11/5/18</a:t>
+              <a:t>12/5/18</a:t>
             </a:fld>
             <a:endParaRPr lang="en-US"/>
           </a:p>
@@ -3177,7 +3177,7 @@
           <a:p>
             <a:fld id="{61EC71EF-7FD6-954C-A622-2C736F9D07E0}" type="datetimeFigureOut">
               <a:rPr lang="en-US" smtClean="0"/>
-              <a:t>11/5/18</a:t>
+              <a:t>12/5/18</a:t>
             </a:fld>
             <a:endParaRPr lang="en-US"/>
           </a:p>
@@ -3574,8 +3574,8 @@
         </p:blipFill>
         <p:spPr>
           <a:xfrm>
-            <a:off x="540029" y="501445"/>
-            <a:ext cx="2560320" cy="1706880"/>
+            <a:off x="540030" y="501446"/>
+            <a:ext cx="2880359" cy="1920239"/>
           </a:xfrm>
           <a:prstGeom prst="rect">
             <a:avLst/>
@@ -3604,8 +3604,8 @@
         </p:blipFill>
         <p:spPr>
           <a:xfrm>
-            <a:off x="540029" y="2506138"/>
-            <a:ext cx="2560320" cy="1706880"/>
+            <a:off x="540030" y="2506139"/>
+            <a:ext cx="2880359" cy="1920239"/>
           </a:xfrm>
           <a:prstGeom prst="rect">
             <a:avLst/>
@@ -3634,8 +3634,8 @@
         </p:blipFill>
         <p:spPr>
           <a:xfrm>
-            <a:off x="540029" y="4510831"/>
-            <a:ext cx="2560320" cy="1706880"/>
+            <a:off x="540030" y="4510832"/>
+            <a:ext cx="2880359" cy="1920239"/>
           </a:xfrm>
           <a:prstGeom prst="rect">
             <a:avLst/>
@@ -3664,8 +3664,8 @@
         </p:blipFill>
         <p:spPr>
           <a:xfrm>
-            <a:off x="540029" y="6515524"/>
-            <a:ext cx="2560320" cy="1706880"/>
+            <a:off x="540030" y="6515525"/>
+            <a:ext cx="2880359" cy="1920239"/>
           </a:xfrm>
           <a:prstGeom prst="rect">
             <a:avLst/>
@@ -3694,8 +3694,8 @@
         </p:blipFill>
         <p:spPr>
           <a:xfrm>
-            <a:off x="3743632" y="501445"/>
-            <a:ext cx="2560320" cy="1706880"/>
+            <a:off x="3830401" y="501446"/>
+            <a:ext cx="2880359" cy="1920239"/>
           </a:xfrm>
           <a:prstGeom prst="rect">
             <a:avLst/>
@@ -3724,8 +3724,8 @@
         </p:blipFill>
         <p:spPr>
           <a:xfrm>
-            <a:off x="3743632" y="2506138"/>
-            <a:ext cx="2560320" cy="1706880"/>
+            <a:off x="3830401" y="2506139"/>
+            <a:ext cx="2880359" cy="1920239"/>
           </a:xfrm>
           <a:prstGeom prst="rect">
             <a:avLst/>
@@ -3754,8 +3754,8 @@
         </p:blipFill>
         <p:spPr>
           <a:xfrm>
-            <a:off x="3743632" y="4510831"/>
-            <a:ext cx="2560320" cy="1706880"/>
+            <a:off x="3830401" y="4510832"/>
+            <a:ext cx="2880359" cy="1920239"/>
           </a:xfrm>
           <a:prstGeom prst="rect">
             <a:avLst/>
@@ -3784,8 +3784,8 @@
         </p:blipFill>
         <p:spPr>
           <a:xfrm>
-            <a:off x="3743632" y="6515524"/>
-            <a:ext cx="2560320" cy="1706880"/>
+            <a:off x="3830401" y="6515525"/>
+            <a:ext cx="2880359" cy="1920239"/>
           </a:xfrm>
           <a:prstGeom prst="rect">
             <a:avLst/>
@@ -3844,8 +3844,8 @@
         </p:blipFill>
         <p:spPr>
           <a:xfrm>
-            <a:off x="518653" y="2507226"/>
-            <a:ext cx="2560320" cy="1706880"/>
+            <a:off x="542317" y="2507226"/>
+            <a:ext cx="2880359" cy="1920239"/>
           </a:xfrm>
           <a:prstGeom prst="rect">
             <a:avLst/>
@@ -3874,8 +3874,8 @@
         </p:blipFill>
         <p:spPr>
           <a:xfrm>
-            <a:off x="518653" y="511278"/>
-            <a:ext cx="2560320" cy="1706880"/>
+            <a:off x="534429" y="511278"/>
+            <a:ext cx="2880359" cy="1920239"/>
           </a:xfrm>
           <a:prstGeom prst="rect">
             <a:avLst/>
@@ -3904,8 +3904,8 @@
         </p:blipFill>
         <p:spPr>
           <a:xfrm>
-            <a:off x="518653" y="4503174"/>
-            <a:ext cx="2560320" cy="1706880"/>
+            <a:off x="534429" y="4503174"/>
+            <a:ext cx="2880359" cy="1920239"/>
           </a:xfrm>
           <a:prstGeom prst="rect">
             <a:avLst/>
@@ -3934,8 +3934,8 @@
         </p:blipFill>
         <p:spPr>
           <a:xfrm>
-            <a:off x="518653" y="6499122"/>
-            <a:ext cx="2560320" cy="1706880"/>
+            <a:off x="542317" y="6499122"/>
+            <a:ext cx="2880359" cy="1920239"/>
           </a:xfrm>
           <a:prstGeom prst="rect">
             <a:avLst/>
@@ -3964,8 +3964,8 @@
         </p:blipFill>
         <p:spPr>
           <a:xfrm>
-            <a:off x="3773129" y="511278"/>
-            <a:ext cx="2560320" cy="1706880"/>
+            <a:off x="3828345" y="511278"/>
+            <a:ext cx="2880359" cy="1920239"/>
           </a:xfrm>
           <a:prstGeom prst="rect">
             <a:avLst/>
@@ -3994,8 +3994,8 @@
         </p:blipFill>
         <p:spPr>
           <a:xfrm>
-            <a:off x="3773129" y="2507226"/>
-            <a:ext cx="2560320" cy="1706880"/>
+            <a:off x="3836233" y="2507226"/>
+            <a:ext cx="2880359" cy="1920239"/>
           </a:xfrm>
           <a:prstGeom prst="rect">
             <a:avLst/>
@@ -4024,8 +4024,8 @@
         </p:blipFill>
         <p:spPr>
           <a:xfrm>
-            <a:off x="3773129" y="4503174"/>
-            <a:ext cx="2560320" cy="1706880"/>
+            <a:off x="3820457" y="4503174"/>
+            <a:ext cx="2880359" cy="1920239"/>
           </a:xfrm>
           <a:prstGeom prst="rect">
             <a:avLst/>
@@ -4054,8 +4054,8 @@
         </p:blipFill>
         <p:spPr>
           <a:xfrm>
-            <a:off x="3773129" y="6499122"/>
-            <a:ext cx="2560320" cy="1706880"/>
+            <a:off x="3820457" y="6499122"/>
+            <a:ext cx="2880359" cy="1920239"/>
           </a:xfrm>
           <a:prstGeom prst="rect">
             <a:avLst/>
@@ -4257,10 +4257,6 @@
                         </a:rPr>
                         <a:t>42.2</a:t>
                       </a:r>
-                      <a:endParaRPr lang="en-US" sz="800" dirty="0" smtClean="0">
-                        <a:latin typeface="Helvetica"/>
-                        <a:cs typeface="Helvetica"/>
-                      </a:endParaRPr>
                     </a:p>
                   </a:txBody>
                   <a:tcPr>
@@ -4316,10 +4312,6 @@
                         </a:rPr>
                         <a:t>45.7</a:t>
                       </a:r>
-                      <a:endParaRPr lang="en-US" sz="800" dirty="0" smtClean="0">
-                        <a:latin typeface="Helvetica"/>
-                        <a:cs typeface="Helvetica"/>
-                      </a:endParaRPr>
                     </a:p>
                   </a:txBody>
                   <a:tcPr/>
@@ -4461,14 +4453,7 @@
                           <a:latin typeface="Helvetica"/>
                           <a:cs typeface="Helvetica"/>
                         </a:rPr>
-                        <a:t>&gt; </a:t>
-                      </a:r>
-                      <a:r>
-                        <a:rPr lang="en-US" sz="800" dirty="0" smtClean="0">
-                          <a:latin typeface="Helvetica"/>
-                          <a:cs typeface="Helvetica"/>
-                        </a:rPr>
-                        <a:t>80.0</a:t>
+                        <a:t>&gt; 80.0</a:t>
                       </a:r>
                       <a:endParaRPr lang="en-US" sz="800" dirty="0">
                         <a:latin typeface="Helvetica"/>
@@ -4531,14 +4516,7 @@
                           <a:latin typeface="Helvetica"/>
                           <a:cs typeface="Helvetica"/>
                         </a:rPr>
-                        <a:t>&gt; </a:t>
-                      </a:r>
-                      <a:r>
-                        <a:rPr lang="en-US" sz="800" dirty="0" smtClean="0">
-                          <a:latin typeface="Helvetica"/>
-                          <a:cs typeface="Helvetica"/>
-                        </a:rPr>
-                        <a:t>80.0</a:t>
+                        <a:t>&gt; 80.0</a:t>
                       </a:r>
                       <a:endParaRPr lang="en-US" sz="800" dirty="0">
                         <a:latin typeface="Helvetica"/>
@@ -4587,14 +4565,7 @@
                           <a:latin typeface="Helvetica"/>
                           <a:cs typeface="Helvetica"/>
                         </a:rPr>
-                        <a:t>&gt; </a:t>
-                      </a:r>
-                      <a:r>
-                        <a:rPr lang="en-US" sz="800" dirty="0" smtClean="0">
-                          <a:latin typeface="Helvetica"/>
-                          <a:cs typeface="Helvetica"/>
-                        </a:rPr>
-                        <a:t>80.0</a:t>
+                        <a:t>&gt; 80.0</a:t>
                       </a:r>
                       <a:endParaRPr lang="en-US" sz="800" dirty="0">
                         <a:latin typeface="Helvetica"/>
@@ -4657,14 +4628,7 @@
                           <a:latin typeface="Helvetica"/>
                           <a:cs typeface="Helvetica"/>
                         </a:rPr>
-                        <a:t>&gt; </a:t>
-                      </a:r>
-                      <a:r>
-                        <a:rPr lang="en-US" sz="800" dirty="0" smtClean="0">
-                          <a:latin typeface="Helvetica"/>
-                          <a:cs typeface="Helvetica"/>
-                        </a:rPr>
-                        <a:t>80.0</a:t>
+                        <a:t>&gt; 80.0</a:t>
                       </a:r>
                       <a:endParaRPr lang="en-US" sz="800" dirty="0">
                         <a:latin typeface="Helvetica"/>
@@ -4874,14 +4838,7 @@
                           <a:latin typeface="Helvetica"/>
                           <a:cs typeface="Helvetica"/>
                         </a:rPr>
-                        <a:t>&gt; </a:t>
-                      </a:r>
-                      <a:r>
-                        <a:rPr lang="en-US" sz="800" dirty="0" smtClean="0">
-                          <a:latin typeface="Helvetica"/>
-                          <a:cs typeface="Helvetica"/>
-                        </a:rPr>
-                        <a:t>80.0</a:t>
+                        <a:t>&gt; 80.0</a:t>
                       </a:r>
                       <a:endParaRPr lang="en-US" sz="800" dirty="0">
                         <a:latin typeface="Helvetica"/>
@@ -5028,14 +4985,7 @@
                           <a:latin typeface="Helvetica"/>
                           <a:cs typeface="Helvetica"/>
                         </a:rPr>
-                        <a:t>&gt; </a:t>
-                      </a:r>
-                      <a:r>
-                        <a:rPr lang="en-US" sz="800" dirty="0" smtClean="0">
-                          <a:latin typeface="Helvetica"/>
-                          <a:cs typeface="Helvetica"/>
-                        </a:rPr>
-                        <a:t>80.0</a:t>
+                        <a:t>&gt; 80.0</a:t>
                       </a:r>
                       <a:endParaRPr lang="en-US" sz="800" dirty="0">
                         <a:latin typeface="Helvetica"/>
@@ -5103,7 +5053,7 @@
         <p:spPr>
           <a:xfrm>
             <a:off x="540029" y="423295"/>
-            <a:ext cx="2560320" cy="1706880"/>
+            <a:ext cx="2880359" cy="1920239"/>
           </a:xfrm>
           <a:prstGeom prst="rect">
             <a:avLst/>
@@ -5133,7 +5083,7 @@
         <p:spPr>
           <a:xfrm>
             <a:off x="540029" y="4476510"/>
-            <a:ext cx="2560320" cy="1706880"/>
+            <a:ext cx="2880359" cy="1920239"/>
           </a:xfrm>
           <a:prstGeom prst="rect">
             <a:avLst/>
@@ -5163,7 +5113,7 @@
         <p:spPr>
           <a:xfrm>
             <a:off x="540029" y="6480219"/>
-            <a:ext cx="2560320" cy="1706880"/>
+            <a:ext cx="2880359" cy="1920239"/>
           </a:xfrm>
           <a:prstGeom prst="rect">
             <a:avLst/>
@@ -5193,7 +5143,7 @@
         <p:spPr>
           <a:xfrm>
             <a:off x="3837042" y="423295"/>
-            <a:ext cx="2560320" cy="1706880"/>
+            <a:ext cx="2880359" cy="1920239"/>
           </a:xfrm>
           <a:prstGeom prst="rect">
             <a:avLst/>
@@ -5223,7 +5173,7 @@
         <p:spPr>
           <a:xfrm>
             <a:off x="3837042" y="2449902"/>
-            <a:ext cx="2560320" cy="1706880"/>
+            <a:ext cx="2880359" cy="1920239"/>
           </a:xfrm>
           <a:prstGeom prst="rect">
             <a:avLst/>
@@ -5253,7 +5203,7 @@
         <p:spPr>
           <a:xfrm>
             <a:off x="3837042" y="4476510"/>
-            <a:ext cx="2560320" cy="1706880"/>
+            <a:ext cx="2880359" cy="1920239"/>
           </a:xfrm>
           <a:prstGeom prst="rect">
             <a:avLst/>
@@ -5283,7 +5233,7 @@
         <p:spPr>
           <a:xfrm>
             <a:off x="3837042" y="6503118"/>
-            <a:ext cx="2560320" cy="1706880"/>
+            <a:ext cx="2880359" cy="1920239"/>
           </a:xfrm>
           <a:prstGeom prst="rect">
             <a:avLst/>
@@ -5312,8 +5262,8 @@
         </p:blipFill>
         <p:spPr>
           <a:xfrm>
-            <a:off x="604037" y="2471238"/>
-            <a:ext cx="2496312" cy="1664208"/>
+            <a:off x="548821" y="2471238"/>
+            <a:ext cx="2880359" cy="1920239"/>
           </a:xfrm>
           <a:prstGeom prst="rect">
             <a:avLst/>
@@ -5373,7 +5323,7 @@
         <p:spPr>
           <a:xfrm>
             <a:off x="539496" y="6501137"/>
-            <a:ext cx="2560320" cy="1706880"/>
+            <a:ext cx="2880359" cy="1920239"/>
           </a:xfrm>
           <a:prstGeom prst="rect">
             <a:avLst/>
@@ -5403,7 +5353,7 @@
         <p:spPr>
           <a:xfrm>
             <a:off x="540029" y="2333215"/>
-            <a:ext cx="2560320" cy="1706880"/>
+            <a:ext cx="2880359" cy="1920239"/>
           </a:xfrm>
           <a:prstGeom prst="rect">
             <a:avLst/>
@@ -5433,7 +5383,7 @@
         <p:spPr>
           <a:xfrm>
             <a:off x="3837042" y="4418849"/>
-            <a:ext cx="2560320" cy="1706880"/>
+            <a:ext cx="2880359" cy="1920239"/>
           </a:xfrm>
           <a:prstGeom prst="rect">
             <a:avLst/>
@@ -5462,8 +5412,8 @@
         </p:blipFill>
         <p:spPr>
           <a:xfrm>
-            <a:off x="3901050" y="270590"/>
-            <a:ext cx="2496312" cy="1664208"/>
+            <a:off x="3830058" y="270590"/>
+            <a:ext cx="2880359" cy="1920239"/>
           </a:xfrm>
           <a:prstGeom prst="rect">
             <a:avLst/>
@@ -5493,7 +5443,7 @@
         <p:spPr>
           <a:xfrm>
             <a:off x="540028" y="270944"/>
-            <a:ext cx="2496312" cy="1664208"/>
+            <a:ext cx="2880359" cy="1920239"/>
           </a:xfrm>
           <a:prstGeom prst="rect">
             <a:avLst/>
@@ -5522,8 +5472,8 @@
         </p:blipFill>
         <p:spPr>
           <a:xfrm>
-            <a:off x="3869046" y="2354551"/>
-            <a:ext cx="2496312" cy="1664208"/>
+            <a:off x="3829606" y="2354551"/>
+            <a:ext cx="2880359" cy="1920239"/>
           </a:xfrm>
           <a:prstGeom prst="rect">
             <a:avLst/>
@@ -5553,7 +5503,7 @@
         <p:spPr>
           <a:xfrm>
             <a:off x="539496" y="4438512"/>
-            <a:ext cx="2496312" cy="1664208"/>
+            <a:ext cx="2880359" cy="1920239"/>
           </a:xfrm>
           <a:prstGeom prst="rect">
             <a:avLst/>
@@ -5583,7 +5533,7 @@
         <p:spPr>
           <a:xfrm>
             <a:off x="3805038" y="6501137"/>
-            <a:ext cx="2560320" cy="1706880"/>
+            <a:ext cx="2880359" cy="1920239"/>
           </a:xfrm>
           <a:prstGeom prst="rect">
             <a:avLst/>

</xml_diff>